<commit_message>
Fix misplaced crop lab icons
</commit_message>
<xml_diff>
--- a/doc/Icons-CropLab.pptx
+++ b/doc/Icons-CropLab.pptx
@@ -217,7 +217,7 @@
           <a:p>
             <a:fld id="{6699ACB9-486C-4D62-A3A7-AF98E13EFDA3}" type="datetimeFigureOut">
               <a:rPr lang="en-US" smtClean="0"/>
-              <a:t>2/12/2017</a:t>
+              <a:t>2/15/2017</a:t>
             </a:fld>
             <a:endParaRPr lang="en-US"/>
           </a:p>
@@ -664,7 +664,7 @@
             <a:fld id="{1D8BD707-D9CF-40AE-B4C6-C98DA3205C09}" type="datetimeFigureOut">
               <a:rPr lang="en-US" smtClean="0"/>
               <a:pPr/>
-              <a:t>2/12/2017</a:t>
+              <a:t>2/15/2017</a:t>
             </a:fld>
             <a:endParaRPr lang="en-US"/>
           </a:p>
@@ -829,7 +829,7 @@
             <a:fld id="{1D8BD707-D9CF-40AE-B4C6-C98DA3205C09}" type="datetimeFigureOut">
               <a:rPr lang="en-US" smtClean="0"/>
               <a:pPr/>
-              <a:t>2/12/2017</a:t>
+              <a:t>2/15/2017</a:t>
             </a:fld>
             <a:endParaRPr lang="en-US"/>
           </a:p>
@@ -1004,7 +1004,7 @@
             <a:fld id="{1D8BD707-D9CF-40AE-B4C6-C98DA3205C09}" type="datetimeFigureOut">
               <a:rPr lang="en-US" smtClean="0"/>
               <a:pPr/>
-              <a:t>2/12/2017</a:t>
+              <a:t>2/15/2017</a:t>
             </a:fld>
             <a:endParaRPr lang="en-US"/>
           </a:p>
@@ -1169,7 +1169,7 @@
             <a:fld id="{1D8BD707-D9CF-40AE-B4C6-C98DA3205C09}" type="datetimeFigureOut">
               <a:rPr lang="en-US" smtClean="0"/>
               <a:pPr/>
-              <a:t>2/12/2017</a:t>
+              <a:t>2/15/2017</a:t>
             </a:fld>
             <a:endParaRPr lang="en-US"/>
           </a:p>
@@ -1411,7 +1411,7 @@
             <a:fld id="{1D8BD707-D9CF-40AE-B4C6-C98DA3205C09}" type="datetimeFigureOut">
               <a:rPr lang="en-US" smtClean="0"/>
               <a:pPr/>
-              <a:t>2/12/2017</a:t>
+              <a:t>2/15/2017</a:t>
             </a:fld>
             <a:endParaRPr lang="en-US"/>
           </a:p>
@@ -1693,7 +1693,7 @@
             <a:fld id="{1D8BD707-D9CF-40AE-B4C6-C98DA3205C09}" type="datetimeFigureOut">
               <a:rPr lang="en-US" smtClean="0"/>
               <a:pPr/>
-              <a:t>2/12/2017</a:t>
+              <a:t>2/15/2017</a:t>
             </a:fld>
             <a:endParaRPr lang="en-US"/>
           </a:p>
@@ -2109,7 +2109,7 @@
             <a:fld id="{1D8BD707-D9CF-40AE-B4C6-C98DA3205C09}" type="datetimeFigureOut">
               <a:rPr lang="en-US" smtClean="0"/>
               <a:pPr/>
-              <a:t>2/12/2017</a:t>
+              <a:t>2/15/2017</a:t>
             </a:fld>
             <a:endParaRPr lang="en-US"/>
           </a:p>
@@ -2223,7 +2223,7 @@
             <a:fld id="{1D8BD707-D9CF-40AE-B4C6-C98DA3205C09}" type="datetimeFigureOut">
               <a:rPr lang="en-US" smtClean="0"/>
               <a:pPr/>
-              <a:t>2/12/2017</a:t>
+              <a:t>2/15/2017</a:t>
             </a:fld>
             <a:endParaRPr lang="en-US"/>
           </a:p>
@@ -2315,7 +2315,7 @@
             <a:fld id="{1D8BD707-D9CF-40AE-B4C6-C98DA3205C09}" type="datetimeFigureOut">
               <a:rPr lang="en-US" smtClean="0"/>
               <a:pPr/>
-              <a:t>2/12/2017</a:t>
+              <a:t>2/15/2017</a:t>
             </a:fld>
             <a:endParaRPr lang="en-US"/>
           </a:p>
@@ -2587,7 +2587,7 @@
             <a:fld id="{1D8BD707-D9CF-40AE-B4C6-C98DA3205C09}" type="datetimeFigureOut">
               <a:rPr lang="en-US" smtClean="0"/>
               <a:pPr/>
-              <a:t>2/12/2017</a:t>
+              <a:t>2/15/2017</a:t>
             </a:fld>
             <a:endParaRPr lang="en-US"/>
           </a:p>
@@ -2836,7 +2836,7 @@
             <a:fld id="{1D8BD707-D9CF-40AE-B4C6-C98DA3205C09}" type="datetimeFigureOut">
               <a:rPr lang="en-US" smtClean="0"/>
               <a:pPr/>
-              <a:t>2/12/2017</a:t>
+              <a:t>2/15/2017</a:t>
             </a:fld>
             <a:endParaRPr lang="en-US"/>
           </a:p>
@@ -3044,7 +3044,7 @@
             <a:fld id="{1D8BD707-D9CF-40AE-B4C6-C98DA3205C09}" type="datetimeFigureOut">
               <a:rPr lang="en-US" smtClean="0"/>
               <a:pPr/>
-              <a:t>2/12/2017</a:t>
+              <a:t>2/15/2017</a:t>
             </a:fld>
             <a:endParaRPr lang="en-US"/>
           </a:p>
@@ -3699,7 +3699,7 @@
         </p:nvGrpSpPr>
         <p:grpSpPr>
           <a:xfrm>
-            <a:off x="769531" y="2858912"/>
+            <a:off x="5572560" y="2858912"/>
             <a:ext cx="838200" cy="838200"/>
             <a:chOff x="2113917" y="1428751"/>
             <a:chExt cx="838200" cy="838200"/>
@@ -3971,7 +3971,7 @@
         </p:nvSpPr>
         <p:spPr>
           <a:xfrm>
-            <a:off x="730231" y="3715680"/>
+            <a:off x="5533260" y="3715680"/>
             <a:ext cx="916799" cy="215444"/>
           </a:xfrm>
           <a:prstGeom prst="rect">
@@ -4221,7 +4221,7 @@
           <a:lstStyle/>
           <a:p>
             <a:r>
-              <a:rPr lang="en-US" sz="800" dirty="0" smtClean="0"/>
+              <a:rPr lang="en-US" sz="800" dirty="0"/>
               <a:t>Crop to Slide</a:t>
             </a:r>
             <a:endParaRPr lang="en-SG" sz="800" dirty="0"/>
@@ -4250,8 +4250,9 @@
           </a:bodyPr>
           <a:lstStyle/>
           <a:p>
-            <a:r>
-              <a:rPr lang="en-US" sz="800" dirty="0" smtClean="0"/>
+            <a:pPr algn="ctr"/>
+            <a:r>
+              <a:rPr lang="en-US" sz="800" dirty="0"/>
               <a:t>Crop to Same Dimensions</a:t>
             </a:r>
             <a:endParaRPr lang="en-SG" sz="800" dirty="0"/>
@@ -4282,7 +4283,7 @@
           <a:p>
             <a:pPr algn="ctr"/>
             <a:r>
-              <a:rPr lang="en-US" sz="800" dirty="0" smtClean="0"/>
+              <a:rPr lang="en-US" sz="800" dirty="0"/>
               <a:t>Crop Lab</a:t>
             </a:r>
             <a:endParaRPr lang="en-SG" sz="800" dirty="0"/>
@@ -4910,6 +4911,329 @@
           </p:txBody>
         </p:sp>
       </p:grpSp>
+      <p:grpSp>
+        <p:nvGrpSpPr>
+          <p:cNvPr id="51" name="Group 50"/>
+          <p:cNvGrpSpPr/>
+          <p:nvPr/>
+        </p:nvGrpSpPr>
+        <p:grpSpPr>
+          <a:xfrm>
+            <a:off x="836093" y="2858912"/>
+            <a:ext cx="838200" cy="838200"/>
+            <a:chOff x="5228946" y="2361045"/>
+            <a:chExt cx="838200" cy="838200"/>
+          </a:xfrm>
+        </p:grpSpPr>
+        <p:sp>
+          <p:nvSpPr>
+            <p:cNvPr id="53" name="Rectangle 39"/>
+            <p:cNvSpPr/>
+            <p:nvPr/>
+          </p:nvSpPr>
+          <p:spPr>
+            <a:xfrm>
+              <a:off x="5276698" y="2436461"/>
+              <a:ext cx="590701" cy="494090"/>
+            </a:xfrm>
+            <a:custGeom>
+              <a:avLst/>
+              <a:gdLst/>
+              <a:ahLst/>
+              <a:cxnLst/>
+              <a:rect l="l" t="t" r="r" b="b"/>
+              <a:pathLst>
+                <a:path w="854872" h="762000">
+                  <a:moveTo>
+                    <a:pt x="315122" y="73235"/>
+                  </a:moveTo>
+                  <a:cubicBezTo>
+                    <a:pt x="209912" y="73235"/>
+                    <a:pt x="124622" y="158525"/>
+                    <a:pt x="124622" y="263735"/>
+                  </a:cubicBezTo>
+                  <a:cubicBezTo>
+                    <a:pt x="124622" y="344232"/>
+                    <a:pt x="174550" y="413068"/>
+                    <a:pt x="245272" y="440600"/>
+                  </a:cubicBezTo>
+                  <a:lnTo>
+                    <a:pt x="245272" y="484400"/>
+                  </a:lnTo>
+                  <a:lnTo>
+                    <a:pt x="92872" y="547900"/>
+                  </a:lnTo>
+                  <a:lnTo>
+                    <a:pt x="86522" y="655850"/>
+                  </a:lnTo>
+                  <a:lnTo>
+                    <a:pt x="531022" y="643150"/>
+                  </a:lnTo>
+                  <a:lnTo>
+                    <a:pt x="384972" y="484400"/>
+                  </a:lnTo>
+                  <a:lnTo>
+                    <a:pt x="378974" y="442411"/>
+                  </a:lnTo>
+                  <a:cubicBezTo>
+                    <a:pt x="432013" y="424278"/>
+                    <a:pt x="473931" y="382714"/>
+                    <a:pt x="493073" y="330087"/>
+                  </a:cubicBezTo>
+                  <a:lnTo>
+                    <a:pt x="556422" y="338350"/>
+                  </a:lnTo>
+                  <a:lnTo>
+                    <a:pt x="499272" y="205000"/>
+                  </a:lnTo>
+                  <a:lnTo>
+                    <a:pt x="496531" y="208524"/>
+                  </a:lnTo>
+                  <a:cubicBezTo>
+                    <a:pt x="473664" y="130106"/>
+                    <a:pt x="401034" y="73235"/>
+                    <a:pt x="315122" y="73235"/>
+                  </a:cubicBezTo>
+                  <a:close/>
+                  <a:moveTo>
+                    <a:pt x="0" y="0"/>
+                  </a:moveTo>
+                  <a:lnTo>
+                    <a:pt x="854872" y="0"/>
+                  </a:lnTo>
+                  <a:lnTo>
+                    <a:pt x="854872" y="762000"/>
+                  </a:lnTo>
+                  <a:lnTo>
+                    <a:pt x="0" y="762000"/>
+                  </a:lnTo>
+                  <a:close/>
+                </a:path>
+              </a:pathLst>
+            </a:custGeom>
+            <a:solidFill>
+              <a:schemeClr val="accent6"/>
+            </a:solidFill>
+            <a:ln>
+              <a:noFill/>
+            </a:ln>
+          </p:spPr>
+          <p:style>
+            <a:lnRef idx="2">
+              <a:schemeClr val="accent1">
+                <a:shade val="50000"/>
+              </a:schemeClr>
+            </a:lnRef>
+            <a:fillRef idx="1">
+              <a:schemeClr val="accent1"/>
+            </a:fillRef>
+            <a:effectRef idx="0">
+              <a:schemeClr val="accent1"/>
+            </a:effectRef>
+            <a:fontRef idx="minor">
+              <a:schemeClr val="lt1"/>
+            </a:fontRef>
+          </p:style>
+          <p:txBody>
+            <a:bodyPr rtlCol="0" anchor="ctr"/>
+            <a:lstStyle/>
+            <a:p>
+              <a:pPr algn="ctr"/>
+              <a:endParaRPr lang="en-US"/>
+            </a:p>
+          </p:txBody>
+        </p:sp>
+        <p:sp>
+          <p:nvSpPr>
+            <p:cNvPr id="54" name="Flowchart: Connector 41"/>
+            <p:cNvSpPr/>
+            <p:nvPr/>
+          </p:nvSpPr>
+          <p:spPr>
+            <a:xfrm rot="771170">
+              <a:off x="5635800" y="2669144"/>
+              <a:ext cx="387585" cy="402233"/>
+            </a:xfrm>
+            <a:custGeom>
+              <a:avLst/>
+              <a:gdLst/>
+              <a:ahLst/>
+              <a:cxnLst/>
+              <a:rect l="l" t="t" r="r" b="b"/>
+              <a:pathLst>
+                <a:path w="469900" h="582615">
+                  <a:moveTo>
+                    <a:pt x="228600" y="0"/>
+                  </a:moveTo>
+                  <a:cubicBezTo>
+                    <a:pt x="314512" y="0"/>
+                    <a:pt x="387142" y="56871"/>
+                    <a:pt x="410009" y="135289"/>
+                  </a:cubicBezTo>
+                  <a:lnTo>
+                    <a:pt x="412750" y="131765"/>
+                  </a:lnTo>
+                  <a:lnTo>
+                    <a:pt x="469900" y="265115"/>
+                  </a:lnTo>
+                  <a:lnTo>
+                    <a:pt x="406551" y="256852"/>
+                  </a:lnTo>
+                  <a:cubicBezTo>
+                    <a:pt x="387409" y="309479"/>
+                    <a:pt x="345491" y="351043"/>
+                    <a:pt x="292452" y="369176"/>
+                  </a:cubicBezTo>
+                  <a:lnTo>
+                    <a:pt x="298450" y="411165"/>
+                  </a:lnTo>
+                  <a:lnTo>
+                    <a:pt x="444500" y="569915"/>
+                  </a:lnTo>
+                  <a:lnTo>
+                    <a:pt x="0" y="582615"/>
+                  </a:lnTo>
+                  <a:lnTo>
+                    <a:pt x="6350" y="474665"/>
+                  </a:lnTo>
+                  <a:lnTo>
+                    <a:pt x="158750" y="411165"/>
+                  </a:lnTo>
+                  <a:lnTo>
+                    <a:pt x="158750" y="367365"/>
+                  </a:lnTo>
+                  <a:cubicBezTo>
+                    <a:pt x="88028" y="339833"/>
+                    <a:pt x="38100" y="270997"/>
+                    <a:pt x="38100" y="190500"/>
+                  </a:cubicBezTo>
+                  <a:cubicBezTo>
+                    <a:pt x="38100" y="85290"/>
+                    <a:pt x="123390" y="0"/>
+                    <a:pt x="228600" y="0"/>
+                  </a:cubicBezTo>
+                  <a:close/>
+                </a:path>
+              </a:pathLst>
+            </a:custGeom>
+            <a:solidFill>
+              <a:srgbClr val="0070C0"/>
+            </a:solidFill>
+            <a:ln>
+              <a:solidFill>
+                <a:schemeClr val="bg1">
+                  <a:lumMod val="95000"/>
+                </a:schemeClr>
+              </a:solidFill>
+            </a:ln>
+            <a:effectLst>
+              <a:outerShdw blurRad="63500" sx="102000" sy="102000" algn="ctr" rotWithShape="0">
+                <a:prstClr val="black">
+                  <a:alpha val="40000"/>
+                </a:prstClr>
+              </a:outerShdw>
+            </a:effectLst>
+          </p:spPr>
+          <p:style>
+            <a:lnRef idx="2">
+              <a:schemeClr val="accent1">
+                <a:shade val="50000"/>
+              </a:schemeClr>
+            </a:lnRef>
+            <a:fillRef idx="1">
+              <a:schemeClr val="accent1"/>
+            </a:fillRef>
+            <a:effectRef idx="0">
+              <a:schemeClr val="accent1"/>
+            </a:effectRef>
+            <a:fontRef idx="minor">
+              <a:schemeClr val="lt1"/>
+            </a:fontRef>
+          </p:style>
+          <p:txBody>
+            <a:bodyPr rtlCol="0" anchor="ctr"/>
+            <a:lstStyle/>
+            <a:p>
+              <a:pPr algn="ctr"/>
+              <a:endParaRPr lang="en-US"/>
+            </a:p>
+          </p:txBody>
+        </p:sp>
+        <p:sp>
+          <p:nvSpPr>
+            <p:cNvPr id="55" name="Rectangle 54"/>
+            <p:cNvSpPr/>
+            <p:nvPr/>
+          </p:nvSpPr>
+          <p:spPr>
+            <a:xfrm>
+              <a:off x="5228946" y="2361045"/>
+              <a:ext cx="838200" cy="838200"/>
+            </a:xfrm>
+            <a:prstGeom prst="rect">
+              <a:avLst/>
+            </a:prstGeom>
+            <a:noFill/>
+            <a:ln>
+              <a:noFill/>
+            </a:ln>
+          </p:spPr>
+          <p:style>
+            <a:lnRef idx="2">
+              <a:schemeClr val="accent1">
+                <a:shade val="50000"/>
+              </a:schemeClr>
+            </a:lnRef>
+            <a:fillRef idx="1">
+              <a:schemeClr val="accent1"/>
+            </a:fillRef>
+            <a:effectRef idx="0">
+              <a:schemeClr val="accent1"/>
+            </a:effectRef>
+            <a:fontRef idx="minor">
+              <a:schemeClr val="lt1"/>
+            </a:fontRef>
+          </p:style>
+          <p:txBody>
+            <a:bodyPr rtlCol="0" anchor="ctr"/>
+            <a:lstStyle/>
+            <a:p>
+              <a:pPr algn="ctr"/>
+              <a:endParaRPr lang="en-SG"/>
+            </a:p>
+          </p:txBody>
+        </p:sp>
+      </p:grpSp>
+      <p:sp>
+        <p:nvSpPr>
+          <p:cNvPr id="56" name="TextBox 55"/>
+          <p:cNvSpPr txBox="1"/>
+          <p:nvPr/>
+        </p:nvSpPr>
+        <p:spPr>
+          <a:xfrm>
+            <a:off x="908441" y="3777504"/>
+            <a:ext cx="689438" cy="338554"/>
+          </a:xfrm>
+          <a:prstGeom prst="rect">
+            <a:avLst/>
+          </a:prstGeom>
+          <a:noFill/>
+        </p:spPr>
+        <p:txBody>
+          <a:bodyPr wrap="square" rtlCol="0">
+            <a:spAutoFit/>
+          </a:bodyPr>
+          <a:lstStyle/>
+          <a:p>
+            <a:r>
+              <a:rPr lang="en-US" sz="800" dirty="0"/>
+              <a:t>Cut out shape</a:t>
+            </a:r>
+            <a:endParaRPr lang="en-SG" sz="800" dirty="0"/>
+          </a:p>
+        </p:txBody>
+      </p:sp>
     </p:spTree>
     <p:extLst>
       <p:ext uri="{BB962C8B-B14F-4D97-AF65-F5344CB8AC3E}">

</xml_diff>